<commit_message>
Continue T2 + T1 on slashes
</commit_message>
<xml_diff>
--- a/Preprocessing_tutorials/RA_T1/RA_T1_Figures.pptx
+++ b/Preprocessing_tutorials/RA_T1/RA_T1_Figures.pptx
@@ -5,11 +5,14 @@
     <p:sldMasterId id="2147483660" r:id="rId1"/>
   </p:sldMasterIdLst>
   <p:sldIdLst>
-    <p:sldId id="256" r:id="rId2"/>
-    <p:sldId id="257" r:id="rId3"/>
-    <p:sldId id="259" r:id="rId4"/>
-    <p:sldId id="260" r:id="rId5"/>
-    <p:sldId id="261" r:id="rId6"/>
+    <p:sldId id="262" r:id="rId2"/>
+    <p:sldId id="256" r:id="rId3"/>
+    <p:sldId id="257" r:id="rId4"/>
+    <p:sldId id="259" r:id="rId5"/>
+    <p:sldId id="260" r:id="rId6"/>
+    <p:sldId id="261" r:id="rId7"/>
+    <p:sldId id="263" r:id="rId8"/>
+    <p:sldId id="264" r:id="rId9"/>
   </p:sldIdLst>
   <p:sldSz cx="12192000" cy="6858000"/>
   <p:notesSz cx="6858000" cy="9144000"/>
@@ -247,7 +250,7 @@
           <a:p>
             <a:fld id="{5BF62DD7-E577-4613-BE89-4F18DC9039AB}" type="datetimeFigureOut">
               <a:rPr lang="en-CA" smtClean="0"/>
-              <a:t>2022-01-30</a:t>
+              <a:t>2022-02-02</a:t>
             </a:fld>
             <a:endParaRPr lang="en-CA"/>
           </a:p>
@@ -417,7 +420,7 @@
           <a:p>
             <a:fld id="{5BF62DD7-E577-4613-BE89-4F18DC9039AB}" type="datetimeFigureOut">
               <a:rPr lang="en-CA" smtClean="0"/>
-              <a:t>2022-01-30</a:t>
+              <a:t>2022-02-02</a:t>
             </a:fld>
             <a:endParaRPr lang="en-CA"/>
           </a:p>
@@ -597,7 +600,7 @@
           <a:p>
             <a:fld id="{5BF62DD7-E577-4613-BE89-4F18DC9039AB}" type="datetimeFigureOut">
               <a:rPr lang="en-CA" smtClean="0"/>
-              <a:t>2022-01-30</a:t>
+              <a:t>2022-02-02</a:t>
             </a:fld>
             <a:endParaRPr lang="en-CA"/>
           </a:p>
@@ -767,7 +770,7 @@
           <a:p>
             <a:fld id="{5BF62DD7-E577-4613-BE89-4F18DC9039AB}" type="datetimeFigureOut">
               <a:rPr lang="en-CA" smtClean="0"/>
-              <a:t>2022-01-30</a:t>
+              <a:t>2022-02-02</a:t>
             </a:fld>
             <a:endParaRPr lang="en-CA"/>
           </a:p>
@@ -1013,7 +1016,7 @@
           <a:p>
             <a:fld id="{5BF62DD7-E577-4613-BE89-4F18DC9039AB}" type="datetimeFigureOut">
               <a:rPr lang="en-CA" smtClean="0"/>
-              <a:t>2022-01-30</a:t>
+              <a:t>2022-02-02</a:t>
             </a:fld>
             <a:endParaRPr lang="en-CA"/>
           </a:p>
@@ -1245,7 +1248,7 @@
           <a:p>
             <a:fld id="{5BF62DD7-E577-4613-BE89-4F18DC9039AB}" type="datetimeFigureOut">
               <a:rPr lang="en-CA" smtClean="0"/>
-              <a:t>2022-01-30</a:t>
+              <a:t>2022-02-02</a:t>
             </a:fld>
             <a:endParaRPr lang="en-CA"/>
           </a:p>
@@ -1612,7 +1615,7 @@
           <a:p>
             <a:fld id="{5BF62DD7-E577-4613-BE89-4F18DC9039AB}" type="datetimeFigureOut">
               <a:rPr lang="en-CA" smtClean="0"/>
-              <a:t>2022-01-30</a:t>
+              <a:t>2022-02-02</a:t>
             </a:fld>
             <a:endParaRPr lang="en-CA"/>
           </a:p>
@@ -1730,7 +1733,7 @@
           <a:p>
             <a:fld id="{5BF62DD7-E577-4613-BE89-4F18DC9039AB}" type="datetimeFigureOut">
               <a:rPr lang="en-CA" smtClean="0"/>
-              <a:t>2022-01-30</a:t>
+              <a:t>2022-02-02</a:t>
             </a:fld>
             <a:endParaRPr lang="en-CA"/>
           </a:p>
@@ -1825,7 +1828,7 @@
           <a:p>
             <a:fld id="{5BF62DD7-E577-4613-BE89-4F18DC9039AB}" type="datetimeFigureOut">
               <a:rPr lang="en-CA" smtClean="0"/>
-              <a:t>2022-01-30</a:t>
+              <a:t>2022-02-02</a:t>
             </a:fld>
             <a:endParaRPr lang="en-CA"/>
           </a:p>
@@ -2102,7 +2105,7 @@
           <a:p>
             <a:fld id="{5BF62DD7-E577-4613-BE89-4F18DC9039AB}" type="datetimeFigureOut">
               <a:rPr lang="en-CA" smtClean="0"/>
-              <a:t>2022-01-30</a:t>
+              <a:t>2022-02-02</a:t>
             </a:fld>
             <a:endParaRPr lang="en-CA"/>
           </a:p>
@@ -2359,7 +2362,7 @@
           <a:p>
             <a:fld id="{5BF62DD7-E577-4613-BE89-4F18DC9039AB}" type="datetimeFigureOut">
               <a:rPr lang="en-CA" smtClean="0"/>
-              <a:t>2022-01-30</a:t>
+              <a:t>2022-02-02</a:t>
             </a:fld>
             <a:endParaRPr lang="en-CA"/>
           </a:p>
@@ -2572,7 +2575,7 @@
           <a:p>
             <a:fld id="{5BF62DD7-E577-4613-BE89-4F18DC9039AB}" type="datetimeFigureOut">
               <a:rPr lang="en-CA" smtClean="0"/>
-              <a:t>2022-01-30</a:t>
+              <a:t>2022-02-02</a:t>
             </a:fld>
             <a:endParaRPr lang="en-CA"/>
           </a:p>
@@ -2977,6 +2980,90 @@
           <a:chExt cx="0" cy="0"/>
         </a:xfrm>
       </p:grpSpPr>
+      <p:sp>
+        <p:nvSpPr>
+          <p:cNvPr id="2" name="Titre 1">
+            <a:extLst>
+              <a:ext uri="{FF2B5EF4-FFF2-40B4-BE49-F238E27FC236}">
+                <a16:creationId xmlns:a16="http://schemas.microsoft.com/office/drawing/2014/main" id="{2B716B43-04BE-404D-AF0F-C25C6ABA6807}"/>
+              </a:ext>
+            </a:extLst>
+          </p:cNvPr>
+          <p:cNvSpPr>
+            <a:spLocks noGrp="1"/>
+          </p:cNvSpPr>
+          <p:nvPr>
+            <p:ph type="title"/>
+          </p:nvPr>
+        </p:nvSpPr>
+        <p:spPr/>
+        <p:txBody>
+          <a:bodyPr/>
+          <a:lstStyle/>
+          <a:p>
+            <a:r>
+              <a:rPr lang="en-US" dirty="0"/>
+              <a:t>Tutorial 1</a:t>
+            </a:r>
+            <a:endParaRPr lang="en-CA" dirty="0"/>
+          </a:p>
+        </p:txBody>
+      </p:sp>
+      <p:sp>
+        <p:nvSpPr>
+          <p:cNvPr id="3" name="Espace réservé du texte 2">
+            <a:extLst>
+              <a:ext uri="{FF2B5EF4-FFF2-40B4-BE49-F238E27FC236}">
+                <a16:creationId xmlns:a16="http://schemas.microsoft.com/office/drawing/2014/main" id="{12716D30-5549-44F7-9FB2-C65A7F91E17A}"/>
+              </a:ext>
+            </a:extLst>
+          </p:cNvPr>
+          <p:cNvSpPr>
+            <a:spLocks noGrp="1"/>
+          </p:cNvSpPr>
+          <p:nvPr>
+            <p:ph type="body" idx="1"/>
+          </p:nvPr>
+        </p:nvSpPr>
+        <p:spPr/>
+        <p:txBody>
+          <a:bodyPr/>
+          <a:lstStyle/>
+          <a:p>
+            <a:endParaRPr lang="en-CA"/>
+          </a:p>
+        </p:txBody>
+      </p:sp>
+    </p:spTree>
+    <p:extLst>
+      <p:ext uri="{BB962C8B-B14F-4D97-AF65-F5344CB8AC3E}">
+        <p14:creationId xmlns:p14="http://schemas.microsoft.com/office/powerpoint/2010/main" val="2528881836"/>
+      </p:ext>
+    </p:extLst>
+  </p:cSld>
+  <p:clrMapOvr>
+    <a:masterClrMapping/>
+  </p:clrMapOvr>
+</p:sld>
+</file>
+
+<file path=ppt/slides/slide2.xml><?xml version="1.0" encoding="utf-8"?>
+<p:sld xmlns:a="http://schemas.openxmlformats.org/drawingml/2006/main" xmlns:r="http://schemas.openxmlformats.org/officeDocument/2006/relationships" xmlns:p="http://schemas.openxmlformats.org/presentationml/2006/main">
+  <p:cSld>
+    <p:spTree>
+      <p:nvGrpSpPr>
+        <p:cNvPr id="1" name=""/>
+        <p:cNvGrpSpPr/>
+        <p:nvPr/>
+      </p:nvGrpSpPr>
+      <p:grpSpPr>
+        <a:xfrm>
+          <a:off x="0" y="0"/>
+          <a:ext cx="0" cy="0"/>
+          <a:chOff x="0" y="0"/>
+          <a:chExt cx="0" cy="0"/>
+        </a:xfrm>
+      </p:grpSpPr>
       <p:pic>
         <p:nvPicPr>
           <p:cNvPr id="5" name="Image 4" descr="Une image contenant texte, moniteur, capture d’écran, ordinateur&#10;&#10;Description générée automatiquement">
@@ -3226,7 +3313,7 @@
 </p:sld>
 </file>
 
-<file path=ppt/slides/slide2.xml><?xml version="1.0" encoding="utf-8"?>
+<file path=ppt/slides/slide3.xml><?xml version="1.0" encoding="utf-8"?>
 <p:sld xmlns:a="http://schemas.openxmlformats.org/drawingml/2006/main" xmlns:r="http://schemas.openxmlformats.org/officeDocument/2006/relationships" xmlns:p="http://schemas.openxmlformats.org/presentationml/2006/main">
   <p:cSld>
     <p:spTree>
@@ -3788,7 +3875,7 @@
 </p:sld>
 </file>
 
-<file path=ppt/slides/slide3.xml><?xml version="1.0" encoding="utf-8"?>
+<file path=ppt/slides/slide4.xml><?xml version="1.0" encoding="utf-8"?>
 <p:sld xmlns:a="http://schemas.openxmlformats.org/drawingml/2006/main" xmlns:r="http://schemas.openxmlformats.org/officeDocument/2006/relationships" xmlns:p="http://schemas.openxmlformats.org/presentationml/2006/main">
   <p:cSld>
     <p:spTree>
@@ -3900,7 +3987,7 @@
 </p:sld>
 </file>
 
-<file path=ppt/slides/slide4.xml><?xml version="1.0" encoding="utf-8"?>
+<file path=ppt/slides/slide5.xml><?xml version="1.0" encoding="utf-8"?>
 <p:sld xmlns:a="http://schemas.openxmlformats.org/drawingml/2006/main" xmlns:r="http://schemas.openxmlformats.org/officeDocument/2006/relationships" xmlns:p="http://schemas.openxmlformats.org/presentationml/2006/main">
   <p:cSld>
     <p:spTree>
@@ -4062,7 +4149,7 @@
 </p:sld>
 </file>
 
-<file path=ppt/slides/slide5.xml><?xml version="1.0" encoding="utf-8"?>
+<file path=ppt/slides/slide6.xml><?xml version="1.0" encoding="utf-8"?>
 <p:sld xmlns:a="http://schemas.openxmlformats.org/drawingml/2006/main" xmlns:r="http://schemas.openxmlformats.org/officeDocument/2006/relationships" xmlns:p="http://schemas.openxmlformats.org/presentationml/2006/main">
   <p:cSld>
     <p:spTree>
@@ -4209,6 +4296,1576 @@
     <p:extLst>
       <p:ext uri="{BB962C8B-B14F-4D97-AF65-F5344CB8AC3E}">
         <p14:creationId xmlns:p14="http://schemas.microsoft.com/office/powerpoint/2010/main" val="2807566543"/>
+      </p:ext>
+    </p:extLst>
+  </p:cSld>
+  <p:clrMapOvr>
+    <a:masterClrMapping/>
+  </p:clrMapOvr>
+</p:sld>
+</file>
+
+<file path=ppt/slides/slide7.xml><?xml version="1.0" encoding="utf-8"?>
+<p:sld xmlns:a="http://schemas.openxmlformats.org/drawingml/2006/main" xmlns:r="http://schemas.openxmlformats.org/officeDocument/2006/relationships" xmlns:p="http://schemas.openxmlformats.org/presentationml/2006/main">
+  <p:cSld>
+    <p:spTree>
+      <p:nvGrpSpPr>
+        <p:cNvPr id="1" name=""/>
+        <p:cNvGrpSpPr/>
+        <p:nvPr/>
+      </p:nvGrpSpPr>
+      <p:grpSpPr>
+        <a:xfrm>
+          <a:off x="0" y="0"/>
+          <a:ext cx="0" cy="0"/>
+          <a:chOff x="0" y="0"/>
+          <a:chExt cx="0" cy="0"/>
+        </a:xfrm>
+      </p:grpSpPr>
+      <p:sp>
+        <p:nvSpPr>
+          <p:cNvPr id="2" name="Titre 1">
+            <a:extLst>
+              <a:ext uri="{FF2B5EF4-FFF2-40B4-BE49-F238E27FC236}">
+                <a16:creationId xmlns:a16="http://schemas.microsoft.com/office/drawing/2014/main" id="{2B716B43-04BE-404D-AF0F-C25C6ABA6807}"/>
+              </a:ext>
+            </a:extLst>
+          </p:cNvPr>
+          <p:cNvSpPr>
+            <a:spLocks noGrp="1"/>
+          </p:cNvSpPr>
+          <p:nvPr>
+            <p:ph type="title"/>
+          </p:nvPr>
+        </p:nvSpPr>
+        <p:spPr/>
+        <p:txBody>
+          <a:bodyPr/>
+          <a:lstStyle/>
+          <a:p>
+            <a:r>
+              <a:rPr lang="en-US" dirty="0"/>
+              <a:t>Tutorial 2</a:t>
+            </a:r>
+            <a:endParaRPr lang="en-CA" dirty="0"/>
+          </a:p>
+        </p:txBody>
+      </p:sp>
+      <p:sp>
+        <p:nvSpPr>
+          <p:cNvPr id="3" name="Espace réservé du texte 2">
+            <a:extLst>
+              <a:ext uri="{FF2B5EF4-FFF2-40B4-BE49-F238E27FC236}">
+                <a16:creationId xmlns:a16="http://schemas.microsoft.com/office/drawing/2014/main" id="{12716D30-5549-44F7-9FB2-C65A7F91E17A}"/>
+              </a:ext>
+            </a:extLst>
+          </p:cNvPr>
+          <p:cNvSpPr>
+            <a:spLocks noGrp="1"/>
+          </p:cNvSpPr>
+          <p:nvPr>
+            <p:ph type="body" idx="1"/>
+          </p:nvPr>
+        </p:nvSpPr>
+        <p:spPr/>
+        <p:txBody>
+          <a:bodyPr/>
+          <a:lstStyle/>
+          <a:p>
+            <a:endParaRPr lang="en-CA" dirty="0"/>
+          </a:p>
+        </p:txBody>
+      </p:sp>
+    </p:spTree>
+    <p:extLst>
+      <p:ext uri="{BB962C8B-B14F-4D97-AF65-F5344CB8AC3E}">
+        <p14:creationId xmlns:p14="http://schemas.microsoft.com/office/powerpoint/2010/main" val="846818240"/>
+      </p:ext>
+    </p:extLst>
+  </p:cSld>
+  <p:clrMapOvr>
+    <a:masterClrMapping/>
+  </p:clrMapOvr>
+</p:sld>
+</file>
+
+<file path=ppt/slides/slide8.xml><?xml version="1.0" encoding="utf-8"?>
+<p:sld xmlns:a="http://schemas.openxmlformats.org/drawingml/2006/main" xmlns:r="http://schemas.openxmlformats.org/officeDocument/2006/relationships" xmlns:p="http://schemas.openxmlformats.org/presentationml/2006/main">
+  <p:cSld>
+    <p:bg>
+      <p:bgPr>
+        <a:solidFill>
+          <a:schemeClr val="tx1"/>
+        </a:solidFill>
+        <a:effectLst/>
+      </p:bgPr>
+    </p:bg>
+    <p:spTree>
+      <p:nvGrpSpPr>
+        <p:cNvPr id="1" name=""/>
+        <p:cNvGrpSpPr/>
+        <p:nvPr/>
+      </p:nvGrpSpPr>
+      <p:grpSpPr>
+        <a:xfrm>
+          <a:off x="0" y="0"/>
+          <a:ext cx="0" cy="0"/>
+          <a:chOff x="0" y="0"/>
+          <a:chExt cx="0" cy="0"/>
+        </a:xfrm>
+      </p:grpSpPr>
+      <p:graphicFrame>
+        <p:nvGraphicFramePr>
+          <p:cNvPr id="4" name="Tableau 4">
+            <a:extLst>
+              <a:ext uri="{FF2B5EF4-FFF2-40B4-BE49-F238E27FC236}">
+                <a16:creationId xmlns:a16="http://schemas.microsoft.com/office/drawing/2014/main" id="{A6EFD14F-F951-44E5-825E-02E46C6B428E}"/>
+              </a:ext>
+            </a:extLst>
+          </p:cNvPr>
+          <p:cNvGraphicFramePr>
+            <a:graphicFrameLocks noGrp="1"/>
+          </p:cNvGraphicFramePr>
+          <p:nvPr>
+            <p:extLst>
+              <p:ext uri="{D42A27DB-BD31-4B8C-83A1-F6EECF244321}">
+                <p14:modId xmlns:p14="http://schemas.microsoft.com/office/powerpoint/2010/main" val="756243346"/>
+              </p:ext>
+            </p:extLst>
+          </p:nvPr>
+        </p:nvGraphicFramePr>
+        <p:xfrm>
+          <a:off x="3089820" y="470981"/>
+          <a:ext cx="6481380" cy="1483360"/>
+        </p:xfrm>
+        <a:graphic>
+          <a:graphicData uri="http://schemas.openxmlformats.org/drawingml/2006/table">
+            <a:tbl>
+              <a:tblPr firstRow="1" bandRow="1">
+                <a:tableStyleId>{5C22544A-7EE6-4342-B048-85BDC9FD1C3A}</a:tableStyleId>
+              </a:tblPr>
+              <a:tblGrid>
+                <a:gridCol w="1620345">
+                  <a:extLst>
+                    <a:ext uri="{9D8B030D-6E8A-4147-A177-3AD203B41FA5}">
+                      <a16:colId xmlns:a16="http://schemas.microsoft.com/office/drawing/2014/main" val="1256199739"/>
+                    </a:ext>
+                  </a:extLst>
+                </a:gridCol>
+                <a:gridCol w="1620345">
+                  <a:extLst>
+                    <a:ext uri="{9D8B030D-6E8A-4147-A177-3AD203B41FA5}">
+                      <a16:colId xmlns:a16="http://schemas.microsoft.com/office/drawing/2014/main" val="4221984386"/>
+                    </a:ext>
+                  </a:extLst>
+                </a:gridCol>
+                <a:gridCol w="1620345">
+                  <a:extLst>
+                    <a:ext uri="{9D8B030D-6E8A-4147-A177-3AD203B41FA5}">
+                      <a16:colId xmlns:a16="http://schemas.microsoft.com/office/drawing/2014/main" val="3740197857"/>
+                    </a:ext>
+                  </a:extLst>
+                </a:gridCol>
+                <a:gridCol w="1620345">
+                  <a:extLst>
+                    <a:ext uri="{9D8B030D-6E8A-4147-A177-3AD203B41FA5}">
+                      <a16:colId xmlns:a16="http://schemas.microsoft.com/office/drawing/2014/main" val="3024121591"/>
+                    </a:ext>
+                  </a:extLst>
+                </a:gridCol>
+              </a:tblGrid>
+              <a:tr h="370840">
+                <a:tc>
+                  <a:txBody>
+                    <a:bodyPr/>
+                    <a:lstStyle/>
+                    <a:p>
+                      <a:endParaRPr lang="en-CA" dirty="0"/>
+                    </a:p>
+                  </a:txBody>
+                  <a:tcPr/>
+                </a:tc>
+                <a:tc>
+                  <a:txBody>
+                    <a:bodyPr/>
+                    <a:lstStyle/>
+                    <a:p>
+                      <a:r>
+                        <a:rPr lang="en-US" dirty="0"/>
+                        <a:t>Item 1</a:t>
+                      </a:r>
+                      <a:endParaRPr lang="en-CA" dirty="0"/>
+                    </a:p>
+                  </a:txBody>
+                  <a:tcPr/>
+                </a:tc>
+                <a:tc>
+                  <a:txBody>
+                    <a:bodyPr/>
+                    <a:lstStyle/>
+                    <a:p>
+                      <a:r>
+                        <a:rPr lang="en-US" dirty="0"/>
+                        <a:t>Item 2</a:t>
+                      </a:r>
+                      <a:endParaRPr lang="en-CA" dirty="0"/>
+                    </a:p>
+                  </a:txBody>
+                  <a:tcPr/>
+                </a:tc>
+                <a:tc>
+                  <a:txBody>
+                    <a:bodyPr/>
+                    <a:lstStyle/>
+                    <a:p>
+                      <a:r>
+                        <a:rPr lang="en-US" dirty="0"/>
+                        <a:t>…</a:t>
+                      </a:r>
+                      <a:endParaRPr lang="en-CA" dirty="0"/>
+                    </a:p>
+                  </a:txBody>
+                  <a:tcPr/>
+                </a:tc>
+                <a:extLst>
+                  <a:ext uri="{0D108BD9-81ED-4DB2-BD59-A6C34878D82A}">
+                    <a16:rowId xmlns:a16="http://schemas.microsoft.com/office/drawing/2014/main" val="2273624058"/>
+                  </a:ext>
+                </a:extLst>
+              </a:tr>
+              <a:tr h="370840">
+                <a:tc>
+                  <a:txBody>
+                    <a:bodyPr/>
+                    <a:lstStyle/>
+                    <a:p>
+                      <a:r>
+                        <a:rPr lang="en-US" dirty="0"/>
+                        <a:t>Subject 1</a:t>
+                      </a:r>
+                      <a:endParaRPr lang="en-CA" dirty="0"/>
+                    </a:p>
+                  </a:txBody>
+                  <a:tcPr/>
+                </a:tc>
+                <a:tc>
+                  <a:txBody>
+                    <a:bodyPr/>
+                    <a:lstStyle/>
+                    <a:p>
+                      <a:r>
+                        <a:rPr lang="en-US" dirty="0"/>
+                        <a:t>Score…</a:t>
+                      </a:r>
+                      <a:endParaRPr lang="en-CA" dirty="0"/>
+                    </a:p>
+                  </a:txBody>
+                  <a:tcPr/>
+                </a:tc>
+                <a:tc>
+                  <a:txBody>
+                    <a:bodyPr/>
+                    <a:lstStyle/>
+                    <a:p>
+                      <a:endParaRPr lang="en-CA" dirty="0"/>
+                    </a:p>
+                  </a:txBody>
+                  <a:tcPr/>
+                </a:tc>
+                <a:tc>
+                  <a:txBody>
+                    <a:bodyPr/>
+                    <a:lstStyle/>
+                    <a:p>
+                      <a:endParaRPr lang="en-CA"/>
+                    </a:p>
+                  </a:txBody>
+                  <a:tcPr/>
+                </a:tc>
+                <a:extLst>
+                  <a:ext uri="{0D108BD9-81ED-4DB2-BD59-A6C34878D82A}">
+                    <a16:rowId xmlns:a16="http://schemas.microsoft.com/office/drawing/2014/main" val="2626651354"/>
+                  </a:ext>
+                </a:extLst>
+              </a:tr>
+              <a:tr h="370840">
+                <a:tc>
+                  <a:txBody>
+                    <a:bodyPr/>
+                    <a:lstStyle/>
+                    <a:p>
+                      <a:r>
+                        <a:rPr lang="en-US" dirty="0"/>
+                        <a:t>Subject 2</a:t>
+                      </a:r>
+                      <a:endParaRPr lang="en-CA" dirty="0"/>
+                    </a:p>
+                  </a:txBody>
+                  <a:tcPr/>
+                </a:tc>
+                <a:tc>
+                  <a:txBody>
+                    <a:bodyPr/>
+                    <a:lstStyle/>
+                    <a:p>
+                      <a:endParaRPr lang="en-CA" dirty="0"/>
+                    </a:p>
+                  </a:txBody>
+                  <a:tcPr/>
+                </a:tc>
+                <a:tc>
+                  <a:txBody>
+                    <a:bodyPr/>
+                    <a:lstStyle/>
+                    <a:p>
+                      <a:endParaRPr lang="en-CA"/>
+                    </a:p>
+                  </a:txBody>
+                  <a:tcPr/>
+                </a:tc>
+                <a:tc>
+                  <a:txBody>
+                    <a:bodyPr/>
+                    <a:lstStyle/>
+                    <a:p>
+                      <a:endParaRPr lang="en-CA"/>
+                    </a:p>
+                  </a:txBody>
+                  <a:tcPr/>
+                </a:tc>
+                <a:extLst>
+                  <a:ext uri="{0D108BD9-81ED-4DB2-BD59-A6C34878D82A}">
+                    <a16:rowId xmlns:a16="http://schemas.microsoft.com/office/drawing/2014/main" val="1684424199"/>
+                  </a:ext>
+                </a:extLst>
+              </a:tr>
+              <a:tr h="370840">
+                <a:tc>
+                  <a:txBody>
+                    <a:bodyPr/>
+                    <a:lstStyle/>
+                    <a:p>
+                      <a:r>
+                        <a:rPr lang="en-US" dirty="0"/>
+                        <a:t>Subject 3</a:t>
+                      </a:r>
+                      <a:endParaRPr lang="en-CA" dirty="0"/>
+                    </a:p>
+                  </a:txBody>
+                  <a:tcPr/>
+                </a:tc>
+                <a:tc>
+                  <a:txBody>
+                    <a:bodyPr/>
+                    <a:lstStyle/>
+                    <a:p>
+                      <a:endParaRPr lang="en-CA"/>
+                    </a:p>
+                  </a:txBody>
+                  <a:tcPr/>
+                </a:tc>
+                <a:tc>
+                  <a:txBody>
+                    <a:bodyPr/>
+                    <a:lstStyle/>
+                    <a:p>
+                      <a:endParaRPr lang="en-CA" dirty="0"/>
+                    </a:p>
+                  </a:txBody>
+                  <a:tcPr/>
+                </a:tc>
+                <a:tc>
+                  <a:txBody>
+                    <a:bodyPr/>
+                    <a:lstStyle/>
+                    <a:p>
+                      <a:endParaRPr lang="en-CA" dirty="0"/>
+                    </a:p>
+                  </a:txBody>
+                  <a:tcPr/>
+                </a:tc>
+                <a:extLst>
+                  <a:ext uri="{0D108BD9-81ED-4DB2-BD59-A6C34878D82A}">
+                    <a16:rowId xmlns:a16="http://schemas.microsoft.com/office/drawing/2014/main" val="4040785310"/>
+                  </a:ext>
+                </a:extLst>
+              </a:tr>
+            </a:tbl>
+          </a:graphicData>
+        </a:graphic>
+      </p:graphicFrame>
+      <p:graphicFrame>
+        <p:nvGraphicFramePr>
+          <p:cNvPr id="7" name="Tableau 4">
+            <a:extLst>
+              <a:ext uri="{FF2B5EF4-FFF2-40B4-BE49-F238E27FC236}">
+                <a16:creationId xmlns:a16="http://schemas.microsoft.com/office/drawing/2014/main" id="{25014C2D-BEDB-48B1-A18F-E381F71D8505}"/>
+              </a:ext>
+            </a:extLst>
+          </p:cNvPr>
+          <p:cNvGraphicFramePr>
+            <a:graphicFrameLocks noGrp="1"/>
+          </p:cNvGraphicFramePr>
+          <p:nvPr>
+            <p:extLst>
+              <p:ext uri="{D42A27DB-BD31-4B8C-83A1-F6EECF244321}">
+                <p14:modId xmlns:p14="http://schemas.microsoft.com/office/powerpoint/2010/main" val="2567610207"/>
+              </p:ext>
+            </p:extLst>
+          </p:nvPr>
+        </p:nvGraphicFramePr>
+        <p:xfrm>
+          <a:off x="181701" y="2951816"/>
+          <a:ext cx="5075067" cy="1483360"/>
+        </p:xfrm>
+        <a:graphic>
+          <a:graphicData uri="http://schemas.openxmlformats.org/drawingml/2006/table">
+            <a:tbl>
+              <a:tblPr firstRow="1" bandRow="1">
+                <a:tableStyleId>{5C22544A-7EE6-4342-B048-85BDC9FD1C3A}</a:tableStyleId>
+              </a:tblPr>
+              <a:tblGrid>
+                <a:gridCol w="1691689">
+                  <a:extLst>
+                    <a:ext uri="{9D8B030D-6E8A-4147-A177-3AD203B41FA5}">
+                      <a16:colId xmlns:a16="http://schemas.microsoft.com/office/drawing/2014/main" val="1256199739"/>
+                    </a:ext>
+                  </a:extLst>
+                </a:gridCol>
+                <a:gridCol w="1691689">
+                  <a:extLst>
+                    <a:ext uri="{9D8B030D-6E8A-4147-A177-3AD203B41FA5}">
+                      <a16:colId xmlns:a16="http://schemas.microsoft.com/office/drawing/2014/main" val="4221984386"/>
+                    </a:ext>
+                  </a:extLst>
+                </a:gridCol>
+                <a:gridCol w="1691689">
+                  <a:extLst>
+                    <a:ext uri="{9D8B030D-6E8A-4147-A177-3AD203B41FA5}">
+                      <a16:colId xmlns:a16="http://schemas.microsoft.com/office/drawing/2014/main" val="3740197857"/>
+                    </a:ext>
+                  </a:extLst>
+                </a:gridCol>
+              </a:tblGrid>
+              <a:tr h="370840">
+                <a:tc>
+                  <a:txBody>
+                    <a:bodyPr/>
+                    <a:lstStyle/>
+                    <a:p>
+                      <a:r>
+                        <a:rPr lang="en-US" dirty="0"/>
+                        <a:t>Subject</a:t>
+                      </a:r>
+                      <a:endParaRPr lang="en-CA" dirty="0"/>
+                    </a:p>
+                  </a:txBody>
+                  <a:tcPr/>
+                </a:tc>
+                <a:tc>
+                  <a:txBody>
+                    <a:bodyPr/>
+                    <a:lstStyle/>
+                    <a:p>
+                      <a:r>
+                        <a:rPr lang="en-US" dirty="0"/>
+                        <a:t>Item</a:t>
+                      </a:r>
+                      <a:endParaRPr lang="en-CA" dirty="0"/>
+                    </a:p>
+                  </a:txBody>
+                  <a:tcPr/>
+                </a:tc>
+                <a:tc>
+                  <a:txBody>
+                    <a:bodyPr/>
+                    <a:lstStyle/>
+                    <a:p>
+                      <a:r>
+                        <a:rPr lang="en-US" dirty="0"/>
+                        <a:t>Score</a:t>
+                      </a:r>
+                      <a:endParaRPr lang="en-CA" dirty="0"/>
+                    </a:p>
+                  </a:txBody>
+                  <a:tcPr/>
+                </a:tc>
+                <a:extLst>
+                  <a:ext uri="{0D108BD9-81ED-4DB2-BD59-A6C34878D82A}">
+                    <a16:rowId xmlns:a16="http://schemas.microsoft.com/office/drawing/2014/main" val="2273624058"/>
+                  </a:ext>
+                </a:extLst>
+              </a:tr>
+              <a:tr h="370840">
+                <a:tc>
+                  <a:txBody>
+                    <a:bodyPr/>
+                    <a:lstStyle/>
+                    <a:p>
+                      <a:r>
+                        <a:rPr lang="en-US" dirty="0"/>
+                        <a:t>Subject 1</a:t>
+                      </a:r>
+                      <a:endParaRPr lang="en-CA" dirty="0"/>
+                    </a:p>
+                  </a:txBody>
+                  <a:tcPr/>
+                </a:tc>
+                <a:tc>
+                  <a:txBody>
+                    <a:bodyPr/>
+                    <a:lstStyle/>
+                    <a:p>
+                      <a:r>
+                        <a:rPr lang="en-US" dirty="0"/>
+                        <a:t>Item 1</a:t>
+                      </a:r>
+                      <a:endParaRPr lang="en-CA" dirty="0"/>
+                    </a:p>
+                  </a:txBody>
+                  <a:tcPr/>
+                </a:tc>
+                <a:tc>
+                  <a:txBody>
+                    <a:bodyPr/>
+                    <a:lstStyle/>
+                    <a:p>
+                      <a:endParaRPr lang="en-CA" dirty="0"/>
+                    </a:p>
+                  </a:txBody>
+                  <a:tcPr/>
+                </a:tc>
+                <a:extLst>
+                  <a:ext uri="{0D108BD9-81ED-4DB2-BD59-A6C34878D82A}">
+                    <a16:rowId xmlns:a16="http://schemas.microsoft.com/office/drawing/2014/main" val="2626651354"/>
+                  </a:ext>
+                </a:extLst>
+              </a:tr>
+              <a:tr h="370840">
+                <a:tc>
+                  <a:txBody>
+                    <a:bodyPr/>
+                    <a:lstStyle/>
+                    <a:p>
+                      <a:r>
+                        <a:rPr lang="en-US" dirty="0"/>
+                        <a:t>Subject 1</a:t>
+                      </a:r>
+                      <a:endParaRPr lang="en-CA" dirty="0"/>
+                    </a:p>
+                  </a:txBody>
+                  <a:tcPr/>
+                </a:tc>
+                <a:tc>
+                  <a:txBody>
+                    <a:bodyPr/>
+                    <a:lstStyle/>
+                    <a:p>
+                      <a:r>
+                        <a:rPr lang="en-US" dirty="0"/>
+                        <a:t>Item 2</a:t>
+                      </a:r>
+                      <a:endParaRPr lang="en-CA" dirty="0"/>
+                    </a:p>
+                  </a:txBody>
+                  <a:tcPr/>
+                </a:tc>
+                <a:tc>
+                  <a:txBody>
+                    <a:bodyPr/>
+                    <a:lstStyle/>
+                    <a:p>
+                      <a:endParaRPr lang="en-CA"/>
+                    </a:p>
+                  </a:txBody>
+                  <a:tcPr/>
+                </a:tc>
+                <a:extLst>
+                  <a:ext uri="{0D108BD9-81ED-4DB2-BD59-A6C34878D82A}">
+                    <a16:rowId xmlns:a16="http://schemas.microsoft.com/office/drawing/2014/main" val="1684424199"/>
+                  </a:ext>
+                </a:extLst>
+              </a:tr>
+              <a:tr h="370840">
+                <a:tc>
+                  <a:txBody>
+                    <a:bodyPr/>
+                    <a:lstStyle/>
+                    <a:p>
+                      <a:r>
+                        <a:rPr lang="en-US" dirty="0"/>
+                        <a:t>Subject 1</a:t>
+                      </a:r>
+                      <a:endParaRPr lang="en-CA" dirty="0"/>
+                    </a:p>
+                  </a:txBody>
+                  <a:tcPr/>
+                </a:tc>
+                <a:tc>
+                  <a:txBody>
+                    <a:bodyPr/>
+                    <a:lstStyle/>
+                    <a:p>
+                      <a:r>
+                        <a:rPr lang="en-US" dirty="0"/>
+                        <a:t>Item 3</a:t>
+                      </a:r>
+                      <a:endParaRPr lang="en-CA" dirty="0"/>
+                    </a:p>
+                  </a:txBody>
+                  <a:tcPr/>
+                </a:tc>
+                <a:tc>
+                  <a:txBody>
+                    <a:bodyPr/>
+                    <a:lstStyle/>
+                    <a:p>
+                      <a:endParaRPr lang="en-CA" dirty="0"/>
+                    </a:p>
+                  </a:txBody>
+                  <a:tcPr/>
+                </a:tc>
+                <a:extLst>
+                  <a:ext uri="{0D108BD9-81ED-4DB2-BD59-A6C34878D82A}">
+                    <a16:rowId xmlns:a16="http://schemas.microsoft.com/office/drawing/2014/main" val="4040785310"/>
+                  </a:ext>
+                </a:extLst>
+              </a:tr>
+            </a:tbl>
+          </a:graphicData>
+        </a:graphic>
+      </p:graphicFrame>
+      <p:graphicFrame>
+        <p:nvGraphicFramePr>
+          <p:cNvPr id="8" name="Tableau 4">
+            <a:extLst>
+              <a:ext uri="{FF2B5EF4-FFF2-40B4-BE49-F238E27FC236}">
+                <a16:creationId xmlns:a16="http://schemas.microsoft.com/office/drawing/2014/main" id="{0C41B571-2D26-4DBE-8AE7-E95C0ED5652A}"/>
+              </a:ext>
+            </a:extLst>
+          </p:cNvPr>
+          <p:cNvGraphicFramePr>
+            <a:graphicFrameLocks noGrp="1"/>
+          </p:cNvGraphicFramePr>
+          <p:nvPr>
+            <p:extLst>
+              <p:ext uri="{D42A27DB-BD31-4B8C-83A1-F6EECF244321}">
+                <p14:modId xmlns:p14="http://schemas.microsoft.com/office/powerpoint/2010/main" val="1966874485"/>
+              </p:ext>
+            </p:extLst>
+          </p:nvPr>
+        </p:nvGraphicFramePr>
+        <p:xfrm>
+          <a:off x="2151355" y="4300396"/>
+          <a:ext cx="5075067" cy="1483360"/>
+        </p:xfrm>
+        <a:graphic>
+          <a:graphicData uri="http://schemas.openxmlformats.org/drawingml/2006/table">
+            <a:tbl>
+              <a:tblPr firstRow="1" bandRow="1">
+                <a:tableStyleId>{5C22544A-7EE6-4342-B048-85BDC9FD1C3A}</a:tableStyleId>
+              </a:tblPr>
+              <a:tblGrid>
+                <a:gridCol w="1691689">
+                  <a:extLst>
+                    <a:ext uri="{9D8B030D-6E8A-4147-A177-3AD203B41FA5}">
+                      <a16:colId xmlns:a16="http://schemas.microsoft.com/office/drawing/2014/main" val="1256199739"/>
+                    </a:ext>
+                  </a:extLst>
+                </a:gridCol>
+                <a:gridCol w="1691689">
+                  <a:extLst>
+                    <a:ext uri="{9D8B030D-6E8A-4147-A177-3AD203B41FA5}">
+                      <a16:colId xmlns:a16="http://schemas.microsoft.com/office/drawing/2014/main" val="4221984386"/>
+                    </a:ext>
+                  </a:extLst>
+                </a:gridCol>
+                <a:gridCol w="1691689">
+                  <a:extLst>
+                    <a:ext uri="{9D8B030D-6E8A-4147-A177-3AD203B41FA5}">
+                      <a16:colId xmlns:a16="http://schemas.microsoft.com/office/drawing/2014/main" val="3740197857"/>
+                    </a:ext>
+                  </a:extLst>
+                </a:gridCol>
+              </a:tblGrid>
+              <a:tr h="370840">
+                <a:tc>
+                  <a:txBody>
+                    <a:bodyPr/>
+                    <a:lstStyle/>
+                    <a:p>
+                      <a:r>
+                        <a:rPr lang="en-US" dirty="0"/>
+                        <a:t>Subject</a:t>
+                      </a:r>
+                      <a:endParaRPr lang="en-CA" dirty="0"/>
+                    </a:p>
+                  </a:txBody>
+                  <a:tcPr/>
+                </a:tc>
+                <a:tc>
+                  <a:txBody>
+                    <a:bodyPr/>
+                    <a:lstStyle/>
+                    <a:p>
+                      <a:r>
+                        <a:rPr lang="en-US" dirty="0"/>
+                        <a:t>Item</a:t>
+                      </a:r>
+                      <a:endParaRPr lang="en-CA" dirty="0"/>
+                    </a:p>
+                  </a:txBody>
+                  <a:tcPr/>
+                </a:tc>
+                <a:tc>
+                  <a:txBody>
+                    <a:bodyPr/>
+                    <a:lstStyle/>
+                    <a:p>
+                      <a:r>
+                        <a:rPr lang="en-US" dirty="0"/>
+                        <a:t>Score</a:t>
+                      </a:r>
+                      <a:endParaRPr lang="en-CA" dirty="0"/>
+                    </a:p>
+                  </a:txBody>
+                  <a:tcPr/>
+                </a:tc>
+                <a:extLst>
+                  <a:ext uri="{0D108BD9-81ED-4DB2-BD59-A6C34878D82A}">
+                    <a16:rowId xmlns:a16="http://schemas.microsoft.com/office/drawing/2014/main" val="2273624058"/>
+                  </a:ext>
+                </a:extLst>
+              </a:tr>
+              <a:tr h="370840">
+                <a:tc>
+                  <a:txBody>
+                    <a:bodyPr/>
+                    <a:lstStyle/>
+                    <a:p>
+                      <a:r>
+                        <a:rPr lang="en-US" dirty="0"/>
+                        <a:t>Subject 2</a:t>
+                      </a:r>
+                      <a:endParaRPr lang="en-CA" dirty="0"/>
+                    </a:p>
+                  </a:txBody>
+                  <a:tcPr/>
+                </a:tc>
+                <a:tc>
+                  <a:txBody>
+                    <a:bodyPr/>
+                    <a:lstStyle/>
+                    <a:p>
+                      <a:r>
+                        <a:rPr lang="en-US" dirty="0"/>
+                        <a:t>Item 1</a:t>
+                      </a:r>
+                      <a:endParaRPr lang="en-CA" dirty="0"/>
+                    </a:p>
+                  </a:txBody>
+                  <a:tcPr/>
+                </a:tc>
+                <a:tc>
+                  <a:txBody>
+                    <a:bodyPr/>
+                    <a:lstStyle/>
+                    <a:p>
+                      <a:endParaRPr lang="en-CA" dirty="0"/>
+                    </a:p>
+                  </a:txBody>
+                  <a:tcPr/>
+                </a:tc>
+                <a:extLst>
+                  <a:ext uri="{0D108BD9-81ED-4DB2-BD59-A6C34878D82A}">
+                    <a16:rowId xmlns:a16="http://schemas.microsoft.com/office/drawing/2014/main" val="2626651354"/>
+                  </a:ext>
+                </a:extLst>
+              </a:tr>
+              <a:tr h="370840">
+                <a:tc>
+                  <a:txBody>
+                    <a:bodyPr/>
+                    <a:lstStyle/>
+                    <a:p>
+                      <a:r>
+                        <a:rPr lang="en-US" dirty="0"/>
+                        <a:t>Subject 2</a:t>
+                      </a:r>
+                      <a:endParaRPr lang="en-CA" dirty="0"/>
+                    </a:p>
+                  </a:txBody>
+                  <a:tcPr/>
+                </a:tc>
+                <a:tc>
+                  <a:txBody>
+                    <a:bodyPr/>
+                    <a:lstStyle/>
+                    <a:p>
+                      <a:r>
+                        <a:rPr lang="en-US" dirty="0"/>
+                        <a:t>Item 2</a:t>
+                      </a:r>
+                      <a:endParaRPr lang="en-CA" dirty="0"/>
+                    </a:p>
+                  </a:txBody>
+                  <a:tcPr/>
+                </a:tc>
+                <a:tc>
+                  <a:txBody>
+                    <a:bodyPr/>
+                    <a:lstStyle/>
+                    <a:p>
+                      <a:endParaRPr lang="en-CA"/>
+                    </a:p>
+                  </a:txBody>
+                  <a:tcPr/>
+                </a:tc>
+                <a:extLst>
+                  <a:ext uri="{0D108BD9-81ED-4DB2-BD59-A6C34878D82A}">
+                    <a16:rowId xmlns:a16="http://schemas.microsoft.com/office/drawing/2014/main" val="1684424199"/>
+                  </a:ext>
+                </a:extLst>
+              </a:tr>
+              <a:tr h="370840">
+                <a:tc>
+                  <a:txBody>
+                    <a:bodyPr/>
+                    <a:lstStyle/>
+                    <a:p>
+                      <a:r>
+                        <a:rPr lang="en-US" dirty="0"/>
+                        <a:t>Subject 2</a:t>
+                      </a:r>
+                      <a:endParaRPr lang="en-CA" dirty="0"/>
+                    </a:p>
+                  </a:txBody>
+                  <a:tcPr/>
+                </a:tc>
+                <a:tc>
+                  <a:txBody>
+                    <a:bodyPr/>
+                    <a:lstStyle/>
+                    <a:p>
+                      <a:r>
+                        <a:rPr lang="en-US" dirty="0"/>
+                        <a:t>Item 3</a:t>
+                      </a:r>
+                      <a:endParaRPr lang="en-CA" dirty="0"/>
+                    </a:p>
+                  </a:txBody>
+                  <a:tcPr/>
+                </a:tc>
+                <a:tc>
+                  <a:txBody>
+                    <a:bodyPr/>
+                    <a:lstStyle/>
+                    <a:p>
+                      <a:endParaRPr lang="en-CA" dirty="0"/>
+                    </a:p>
+                  </a:txBody>
+                  <a:tcPr/>
+                </a:tc>
+                <a:extLst>
+                  <a:ext uri="{0D108BD9-81ED-4DB2-BD59-A6C34878D82A}">
+                    <a16:rowId xmlns:a16="http://schemas.microsoft.com/office/drawing/2014/main" val="4040785310"/>
+                  </a:ext>
+                </a:extLst>
+              </a:tr>
+            </a:tbl>
+          </a:graphicData>
+        </a:graphic>
+      </p:graphicFrame>
+      <p:sp>
+        <p:nvSpPr>
+          <p:cNvPr id="9" name="Flèche : droite 8">
+            <a:extLst>
+              <a:ext uri="{FF2B5EF4-FFF2-40B4-BE49-F238E27FC236}">
+                <a16:creationId xmlns:a16="http://schemas.microsoft.com/office/drawing/2014/main" id="{3A021986-4C87-4846-911F-19591E4927E3}"/>
+              </a:ext>
+            </a:extLst>
+          </p:cNvPr>
+          <p:cNvSpPr/>
+          <p:nvPr/>
+        </p:nvSpPr>
+        <p:spPr>
+          <a:xfrm>
+            <a:off x="7386221" y="3693496"/>
+            <a:ext cx="506027" cy="741680"/>
+          </a:xfrm>
+          <a:prstGeom prst="rightArrow">
+            <a:avLst/>
+          </a:prstGeom>
+        </p:spPr>
+        <p:style>
+          <a:lnRef idx="2">
+            <a:schemeClr val="accent1">
+              <a:shade val="50000"/>
+            </a:schemeClr>
+          </a:lnRef>
+          <a:fillRef idx="1">
+            <a:schemeClr val="accent1"/>
+          </a:fillRef>
+          <a:effectRef idx="0">
+            <a:schemeClr val="accent1"/>
+          </a:effectRef>
+          <a:fontRef idx="minor">
+            <a:schemeClr val="lt1"/>
+          </a:fontRef>
+        </p:style>
+        <p:txBody>
+          <a:bodyPr rtlCol="0" anchor="ctr"/>
+          <a:lstStyle/>
+          <a:p>
+            <a:pPr algn="ctr"/>
+            <a:endParaRPr lang="en-CA"/>
+          </a:p>
+        </p:txBody>
+      </p:sp>
+      <p:graphicFrame>
+        <p:nvGraphicFramePr>
+          <p:cNvPr id="10" name="Tableau 10">
+            <a:extLst>
+              <a:ext uri="{FF2B5EF4-FFF2-40B4-BE49-F238E27FC236}">
+                <a16:creationId xmlns:a16="http://schemas.microsoft.com/office/drawing/2014/main" id="{6253FE0F-B1CF-46EF-BB17-9E5258C9F1F7}"/>
+              </a:ext>
+            </a:extLst>
+          </p:cNvPr>
+          <p:cNvGraphicFramePr>
+            <a:graphicFrameLocks noGrp="1"/>
+          </p:cNvGraphicFramePr>
+          <p:nvPr>
+            <p:extLst>
+              <p:ext uri="{D42A27DB-BD31-4B8C-83A1-F6EECF244321}">
+                <p14:modId xmlns:p14="http://schemas.microsoft.com/office/powerpoint/2010/main" val="4040774153"/>
+              </p:ext>
+            </p:extLst>
+          </p:nvPr>
+        </p:nvGraphicFramePr>
+        <p:xfrm>
+          <a:off x="8219737" y="3164504"/>
+          <a:ext cx="3676341" cy="2595880"/>
+        </p:xfrm>
+        <a:graphic>
+          <a:graphicData uri="http://schemas.openxmlformats.org/drawingml/2006/table">
+            <a:tbl>
+              <a:tblPr firstRow="1" bandRow="1">
+                <a:tableStyleId>{5C22544A-7EE6-4342-B048-85BDC9FD1C3A}</a:tableStyleId>
+              </a:tblPr>
+              <a:tblGrid>
+                <a:gridCol w="1225447">
+                  <a:extLst>
+                    <a:ext uri="{9D8B030D-6E8A-4147-A177-3AD203B41FA5}">
+                      <a16:colId xmlns:a16="http://schemas.microsoft.com/office/drawing/2014/main" val="3904136258"/>
+                    </a:ext>
+                  </a:extLst>
+                </a:gridCol>
+                <a:gridCol w="1225447">
+                  <a:extLst>
+                    <a:ext uri="{9D8B030D-6E8A-4147-A177-3AD203B41FA5}">
+                      <a16:colId xmlns:a16="http://schemas.microsoft.com/office/drawing/2014/main" val="1807675563"/>
+                    </a:ext>
+                  </a:extLst>
+                </a:gridCol>
+                <a:gridCol w="1225447">
+                  <a:extLst>
+                    <a:ext uri="{9D8B030D-6E8A-4147-A177-3AD203B41FA5}">
+                      <a16:colId xmlns:a16="http://schemas.microsoft.com/office/drawing/2014/main" val="789664060"/>
+                    </a:ext>
+                  </a:extLst>
+                </a:gridCol>
+              </a:tblGrid>
+              <a:tr h="370840">
+                <a:tc>
+                  <a:txBody>
+                    <a:bodyPr/>
+                    <a:lstStyle/>
+                    <a:p>
+                      <a:r>
+                        <a:rPr lang="en-US" dirty="0"/>
+                        <a:t>Subject</a:t>
+                      </a:r>
+                      <a:endParaRPr lang="en-CA" dirty="0"/>
+                    </a:p>
+                  </a:txBody>
+                  <a:tcPr/>
+                </a:tc>
+                <a:tc>
+                  <a:txBody>
+                    <a:bodyPr/>
+                    <a:lstStyle/>
+                    <a:p>
+                      <a:r>
+                        <a:rPr lang="en-US" dirty="0"/>
+                        <a:t>Item</a:t>
+                      </a:r>
+                      <a:endParaRPr lang="en-CA" dirty="0"/>
+                    </a:p>
+                  </a:txBody>
+                  <a:tcPr/>
+                </a:tc>
+                <a:tc>
+                  <a:txBody>
+                    <a:bodyPr/>
+                    <a:lstStyle/>
+                    <a:p>
+                      <a:r>
+                        <a:rPr lang="en-US" dirty="0"/>
+                        <a:t>Score</a:t>
+                      </a:r>
+                      <a:endParaRPr lang="en-CA" dirty="0"/>
+                    </a:p>
+                  </a:txBody>
+                  <a:tcPr/>
+                </a:tc>
+                <a:extLst>
+                  <a:ext uri="{0D108BD9-81ED-4DB2-BD59-A6C34878D82A}">
+                    <a16:rowId xmlns:a16="http://schemas.microsoft.com/office/drawing/2014/main" val="4113373521"/>
+                  </a:ext>
+                </a:extLst>
+              </a:tr>
+              <a:tr h="370840">
+                <a:tc>
+                  <a:txBody>
+                    <a:bodyPr/>
+                    <a:lstStyle/>
+                    <a:p>
+                      <a:r>
+                        <a:rPr lang="en-US" dirty="0"/>
+                        <a:t>Subject 1</a:t>
+                      </a:r>
+                      <a:endParaRPr lang="en-CA" dirty="0"/>
+                    </a:p>
+                  </a:txBody>
+                  <a:tcPr/>
+                </a:tc>
+                <a:tc>
+                  <a:txBody>
+                    <a:bodyPr/>
+                    <a:lstStyle/>
+                    <a:p>
+                      <a:r>
+                        <a:rPr lang="en-US" dirty="0"/>
+                        <a:t>Item 1</a:t>
+                      </a:r>
+                      <a:endParaRPr lang="en-CA" dirty="0"/>
+                    </a:p>
+                  </a:txBody>
+                  <a:tcPr/>
+                </a:tc>
+                <a:tc>
+                  <a:txBody>
+                    <a:bodyPr/>
+                    <a:lstStyle/>
+                    <a:p>
+                      <a:endParaRPr lang="en-CA"/>
+                    </a:p>
+                  </a:txBody>
+                  <a:tcPr/>
+                </a:tc>
+                <a:extLst>
+                  <a:ext uri="{0D108BD9-81ED-4DB2-BD59-A6C34878D82A}">
+                    <a16:rowId xmlns:a16="http://schemas.microsoft.com/office/drawing/2014/main" val="2784064062"/>
+                  </a:ext>
+                </a:extLst>
+              </a:tr>
+              <a:tr h="370840">
+                <a:tc>
+                  <a:txBody>
+                    <a:bodyPr/>
+                    <a:lstStyle/>
+                    <a:p>
+                      <a:r>
+                        <a:rPr lang="en-US" dirty="0"/>
+                        <a:t>Subject 1</a:t>
+                      </a:r>
+                      <a:endParaRPr lang="en-CA" dirty="0"/>
+                    </a:p>
+                  </a:txBody>
+                  <a:tcPr/>
+                </a:tc>
+                <a:tc>
+                  <a:txBody>
+                    <a:bodyPr/>
+                    <a:lstStyle/>
+                    <a:p>
+                      <a:r>
+                        <a:rPr lang="en-US" dirty="0"/>
+                        <a:t>Item 2</a:t>
+                      </a:r>
+                      <a:endParaRPr lang="en-CA" dirty="0"/>
+                    </a:p>
+                  </a:txBody>
+                  <a:tcPr/>
+                </a:tc>
+                <a:tc>
+                  <a:txBody>
+                    <a:bodyPr/>
+                    <a:lstStyle/>
+                    <a:p>
+                      <a:endParaRPr lang="en-CA"/>
+                    </a:p>
+                  </a:txBody>
+                  <a:tcPr/>
+                </a:tc>
+                <a:extLst>
+                  <a:ext uri="{0D108BD9-81ED-4DB2-BD59-A6C34878D82A}">
+                    <a16:rowId xmlns:a16="http://schemas.microsoft.com/office/drawing/2014/main" val="1062576705"/>
+                  </a:ext>
+                </a:extLst>
+              </a:tr>
+              <a:tr h="370840">
+                <a:tc>
+                  <a:txBody>
+                    <a:bodyPr/>
+                    <a:lstStyle/>
+                    <a:p>
+                      <a:r>
+                        <a:rPr lang="en-US" dirty="0"/>
+                        <a:t>Subject 1</a:t>
+                      </a:r>
+                      <a:endParaRPr lang="en-CA" dirty="0"/>
+                    </a:p>
+                  </a:txBody>
+                  <a:tcPr/>
+                </a:tc>
+                <a:tc>
+                  <a:txBody>
+                    <a:bodyPr/>
+                    <a:lstStyle/>
+                    <a:p>
+                      <a:r>
+                        <a:rPr lang="en-US" dirty="0"/>
+                        <a:t>Item 3</a:t>
+                      </a:r>
+                      <a:endParaRPr lang="en-CA" dirty="0"/>
+                    </a:p>
+                  </a:txBody>
+                  <a:tcPr/>
+                </a:tc>
+                <a:tc>
+                  <a:txBody>
+                    <a:bodyPr/>
+                    <a:lstStyle/>
+                    <a:p>
+                      <a:endParaRPr lang="en-CA"/>
+                    </a:p>
+                  </a:txBody>
+                  <a:tcPr/>
+                </a:tc>
+                <a:extLst>
+                  <a:ext uri="{0D108BD9-81ED-4DB2-BD59-A6C34878D82A}">
+                    <a16:rowId xmlns:a16="http://schemas.microsoft.com/office/drawing/2014/main" val="3444495791"/>
+                  </a:ext>
+                </a:extLst>
+              </a:tr>
+              <a:tr h="370840">
+                <a:tc>
+                  <a:txBody>
+                    <a:bodyPr/>
+                    <a:lstStyle/>
+                    <a:p>
+                      <a:r>
+                        <a:rPr lang="en-US" dirty="0"/>
+                        <a:t>Subject 2</a:t>
+                      </a:r>
+                      <a:endParaRPr lang="en-CA" dirty="0"/>
+                    </a:p>
+                  </a:txBody>
+                  <a:tcPr/>
+                </a:tc>
+                <a:tc>
+                  <a:txBody>
+                    <a:bodyPr/>
+                    <a:lstStyle/>
+                    <a:p>
+                      <a:r>
+                        <a:rPr lang="en-US" dirty="0"/>
+                        <a:t>Item 1</a:t>
+                      </a:r>
+                      <a:endParaRPr lang="en-CA" dirty="0"/>
+                    </a:p>
+                  </a:txBody>
+                  <a:tcPr/>
+                </a:tc>
+                <a:tc>
+                  <a:txBody>
+                    <a:bodyPr/>
+                    <a:lstStyle/>
+                    <a:p>
+                      <a:endParaRPr lang="en-CA"/>
+                    </a:p>
+                  </a:txBody>
+                  <a:tcPr/>
+                </a:tc>
+                <a:extLst>
+                  <a:ext uri="{0D108BD9-81ED-4DB2-BD59-A6C34878D82A}">
+                    <a16:rowId xmlns:a16="http://schemas.microsoft.com/office/drawing/2014/main" val="3965774212"/>
+                  </a:ext>
+                </a:extLst>
+              </a:tr>
+              <a:tr h="370840">
+                <a:tc>
+                  <a:txBody>
+                    <a:bodyPr/>
+                    <a:lstStyle/>
+                    <a:p>
+                      <a:r>
+                        <a:rPr lang="en-US" dirty="0"/>
+                        <a:t>Subject 2</a:t>
+                      </a:r>
+                      <a:endParaRPr lang="en-CA" dirty="0"/>
+                    </a:p>
+                  </a:txBody>
+                  <a:tcPr/>
+                </a:tc>
+                <a:tc>
+                  <a:txBody>
+                    <a:bodyPr/>
+                    <a:lstStyle/>
+                    <a:p>
+                      <a:r>
+                        <a:rPr lang="en-US" dirty="0"/>
+                        <a:t>Item 2</a:t>
+                      </a:r>
+                      <a:endParaRPr lang="en-CA" dirty="0"/>
+                    </a:p>
+                  </a:txBody>
+                  <a:tcPr/>
+                </a:tc>
+                <a:tc>
+                  <a:txBody>
+                    <a:bodyPr/>
+                    <a:lstStyle/>
+                    <a:p>
+                      <a:endParaRPr lang="en-CA"/>
+                    </a:p>
+                  </a:txBody>
+                  <a:tcPr/>
+                </a:tc>
+                <a:extLst>
+                  <a:ext uri="{0D108BD9-81ED-4DB2-BD59-A6C34878D82A}">
+                    <a16:rowId xmlns:a16="http://schemas.microsoft.com/office/drawing/2014/main" val="881027054"/>
+                  </a:ext>
+                </a:extLst>
+              </a:tr>
+              <a:tr h="370840">
+                <a:tc>
+                  <a:txBody>
+                    <a:bodyPr/>
+                    <a:lstStyle/>
+                    <a:p>
+                      <a:r>
+                        <a:rPr lang="en-US" dirty="0"/>
+                        <a:t>Subject 2</a:t>
+                      </a:r>
+                      <a:endParaRPr lang="en-CA" dirty="0"/>
+                    </a:p>
+                  </a:txBody>
+                  <a:tcPr/>
+                </a:tc>
+                <a:tc>
+                  <a:txBody>
+                    <a:bodyPr/>
+                    <a:lstStyle/>
+                    <a:p>
+                      <a:r>
+                        <a:rPr lang="en-US" dirty="0"/>
+                        <a:t>Item 3</a:t>
+                      </a:r>
+                      <a:endParaRPr lang="en-CA" dirty="0"/>
+                    </a:p>
+                  </a:txBody>
+                  <a:tcPr/>
+                </a:tc>
+                <a:tc>
+                  <a:txBody>
+                    <a:bodyPr/>
+                    <a:lstStyle/>
+                    <a:p>
+                      <a:endParaRPr lang="en-CA" dirty="0"/>
+                    </a:p>
+                  </a:txBody>
+                  <a:tcPr/>
+                </a:tc>
+                <a:extLst>
+                  <a:ext uri="{0D108BD9-81ED-4DB2-BD59-A6C34878D82A}">
+                    <a16:rowId xmlns:a16="http://schemas.microsoft.com/office/drawing/2014/main" val="3321528033"/>
+                  </a:ext>
+                </a:extLst>
+              </a:tr>
+            </a:tbl>
+          </a:graphicData>
+        </a:graphic>
+      </p:graphicFrame>
+      <p:sp>
+        <p:nvSpPr>
+          <p:cNvPr id="11" name="Accolade ouvrante 10">
+            <a:extLst>
+              <a:ext uri="{FF2B5EF4-FFF2-40B4-BE49-F238E27FC236}">
+                <a16:creationId xmlns:a16="http://schemas.microsoft.com/office/drawing/2014/main" id="{745676D6-ACCF-40B4-9D30-BB3D176E1ACB}"/>
+              </a:ext>
+            </a:extLst>
+          </p:cNvPr>
+          <p:cNvSpPr/>
+          <p:nvPr/>
+        </p:nvSpPr>
+        <p:spPr>
+          <a:xfrm>
+            <a:off x="2725444" y="852299"/>
+            <a:ext cx="364376" cy="1102042"/>
+          </a:xfrm>
+          <a:prstGeom prst="leftBrace">
+            <a:avLst/>
+          </a:prstGeom>
+        </p:spPr>
+        <p:style>
+          <a:lnRef idx="1">
+            <a:schemeClr val="accent1"/>
+          </a:lnRef>
+          <a:fillRef idx="0">
+            <a:schemeClr val="accent1"/>
+          </a:fillRef>
+          <a:effectRef idx="0">
+            <a:schemeClr val="accent1"/>
+          </a:effectRef>
+          <a:fontRef idx="minor">
+            <a:schemeClr val="tx1"/>
+          </a:fontRef>
+        </p:style>
+        <p:txBody>
+          <a:bodyPr rtlCol="0" anchor="ctr"/>
+          <a:lstStyle/>
+          <a:p>
+            <a:pPr algn="ctr"/>
+            <a:endParaRPr lang="en-CA"/>
+          </a:p>
+        </p:txBody>
+      </p:sp>
+      <p:sp>
+        <p:nvSpPr>
+          <p:cNvPr id="12" name="ZoneTexte 11">
+            <a:extLst>
+              <a:ext uri="{FF2B5EF4-FFF2-40B4-BE49-F238E27FC236}">
+                <a16:creationId xmlns:a16="http://schemas.microsoft.com/office/drawing/2014/main" id="{6C0A6F72-E0C7-4BD7-8BCA-7CA460FD2F87}"/>
+              </a:ext>
+            </a:extLst>
+          </p:cNvPr>
+          <p:cNvSpPr txBox="1"/>
+          <p:nvPr/>
+        </p:nvSpPr>
+        <p:spPr>
+          <a:xfrm>
+            <a:off x="1485139" y="1083168"/>
+            <a:ext cx="1240305" cy="646331"/>
+          </a:xfrm>
+          <a:prstGeom prst="rect">
+            <a:avLst/>
+          </a:prstGeom>
+          <a:noFill/>
+        </p:spPr>
+        <p:txBody>
+          <a:bodyPr wrap="square" rtlCol="0">
+            <a:spAutoFit/>
+          </a:bodyPr>
+          <a:lstStyle/>
+          <a:p>
+            <a:r>
+              <a:rPr lang="en-US" dirty="0">
+                <a:solidFill>
+                  <a:schemeClr val="bg1"/>
+                </a:solidFill>
+              </a:rPr>
+              <a:t>One line per subject</a:t>
+            </a:r>
+            <a:endParaRPr lang="en-CA" dirty="0">
+              <a:solidFill>
+                <a:schemeClr val="bg1"/>
+              </a:solidFill>
+            </a:endParaRPr>
+          </a:p>
+        </p:txBody>
+      </p:sp>
+      <p:sp>
+        <p:nvSpPr>
+          <p:cNvPr id="13" name="ZoneTexte 12">
+            <a:extLst>
+              <a:ext uri="{FF2B5EF4-FFF2-40B4-BE49-F238E27FC236}">
+                <a16:creationId xmlns:a16="http://schemas.microsoft.com/office/drawing/2014/main" id="{1CE5AEE3-0C9E-4658-9286-A5BA3001AFA6}"/>
+              </a:ext>
+            </a:extLst>
+          </p:cNvPr>
+          <p:cNvSpPr txBox="1"/>
+          <p:nvPr/>
+        </p:nvSpPr>
+        <p:spPr>
+          <a:xfrm>
+            <a:off x="295922" y="4946766"/>
+            <a:ext cx="1479612" cy="646331"/>
+          </a:xfrm>
+          <a:prstGeom prst="rect">
+            <a:avLst/>
+          </a:prstGeom>
+          <a:noFill/>
+        </p:spPr>
+        <p:txBody>
+          <a:bodyPr wrap="square" rtlCol="0">
+            <a:spAutoFit/>
+          </a:bodyPr>
+          <a:lstStyle/>
+          <a:p>
+            <a:r>
+              <a:rPr lang="en-US" dirty="0">
+                <a:solidFill>
+                  <a:schemeClr val="bg1"/>
+                </a:solidFill>
+              </a:rPr>
+              <a:t>Multiple lines per subject</a:t>
+            </a:r>
+            <a:endParaRPr lang="en-CA" dirty="0">
+              <a:solidFill>
+                <a:schemeClr val="bg1"/>
+              </a:solidFill>
+            </a:endParaRPr>
+          </a:p>
+        </p:txBody>
+      </p:sp>
+      <p:sp>
+        <p:nvSpPr>
+          <p:cNvPr id="14" name="Accolade ouvrante 13">
+            <a:extLst>
+              <a:ext uri="{FF2B5EF4-FFF2-40B4-BE49-F238E27FC236}">
+                <a16:creationId xmlns:a16="http://schemas.microsoft.com/office/drawing/2014/main" id="{B12B0209-882F-482E-809B-2B822ECDB6FC}"/>
+              </a:ext>
+            </a:extLst>
+          </p:cNvPr>
+          <p:cNvSpPr/>
+          <p:nvPr/>
+        </p:nvSpPr>
+        <p:spPr>
+          <a:xfrm>
+            <a:off x="1786979" y="4681714"/>
+            <a:ext cx="364376" cy="1102042"/>
+          </a:xfrm>
+          <a:prstGeom prst="leftBrace">
+            <a:avLst/>
+          </a:prstGeom>
+        </p:spPr>
+        <p:style>
+          <a:lnRef idx="1">
+            <a:schemeClr val="accent1"/>
+          </a:lnRef>
+          <a:fillRef idx="0">
+            <a:schemeClr val="accent1"/>
+          </a:fillRef>
+          <a:effectRef idx="0">
+            <a:schemeClr val="accent1"/>
+          </a:effectRef>
+          <a:fontRef idx="minor">
+            <a:schemeClr val="tx1"/>
+          </a:fontRef>
+        </p:style>
+        <p:txBody>
+          <a:bodyPr rtlCol="0" anchor="ctr"/>
+          <a:lstStyle/>
+          <a:p>
+            <a:pPr algn="ctr"/>
+            <a:endParaRPr lang="en-CA"/>
+          </a:p>
+        </p:txBody>
+      </p:sp>
+      <p:sp>
+        <p:nvSpPr>
+          <p:cNvPr id="15" name="ZoneTexte 14">
+            <a:extLst>
+              <a:ext uri="{FF2B5EF4-FFF2-40B4-BE49-F238E27FC236}">
+                <a16:creationId xmlns:a16="http://schemas.microsoft.com/office/drawing/2014/main" id="{68C0B0AF-9764-4CC3-B05C-B7204313234E}"/>
+              </a:ext>
+            </a:extLst>
+          </p:cNvPr>
+          <p:cNvSpPr txBox="1"/>
+          <p:nvPr/>
+        </p:nvSpPr>
+        <p:spPr>
+          <a:xfrm>
+            <a:off x="1605599" y="2459215"/>
+            <a:ext cx="2215863" cy="369332"/>
+          </a:xfrm>
+          <a:prstGeom prst="rect">
+            <a:avLst/>
+          </a:prstGeom>
+          <a:noFill/>
+        </p:spPr>
+        <p:txBody>
+          <a:bodyPr wrap="none" rtlCol="0">
+            <a:spAutoFit/>
+          </a:bodyPr>
+          <a:lstStyle/>
+          <a:p>
+            <a:r>
+              <a:rPr lang="en-US" dirty="0">
+                <a:solidFill>
+                  <a:schemeClr val="bg1"/>
+                </a:solidFill>
+              </a:rPr>
+              <a:t>Individual dataframes</a:t>
+            </a:r>
+            <a:endParaRPr lang="en-CA" dirty="0">
+              <a:solidFill>
+                <a:schemeClr val="bg1"/>
+              </a:solidFill>
+            </a:endParaRPr>
+          </a:p>
+        </p:txBody>
+      </p:sp>
+      <p:sp>
+        <p:nvSpPr>
+          <p:cNvPr id="16" name="ZoneTexte 15">
+            <a:extLst>
+              <a:ext uri="{FF2B5EF4-FFF2-40B4-BE49-F238E27FC236}">
+                <a16:creationId xmlns:a16="http://schemas.microsoft.com/office/drawing/2014/main" id="{09D0EC6D-C586-47CD-A7F1-8C224EA2ED64}"/>
+              </a:ext>
+            </a:extLst>
+          </p:cNvPr>
+          <p:cNvSpPr txBox="1"/>
+          <p:nvPr/>
+        </p:nvSpPr>
+        <p:spPr>
+          <a:xfrm>
+            <a:off x="8869013" y="2459215"/>
+            <a:ext cx="2170979" cy="369332"/>
+          </a:xfrm>
+          <a:prstGeom prst="rect">
+            <a:avLst/>
+          </a:prstGeom>
+          <a:noFill/>
+        </p:spPr>
+        <p:txBody>
+          <a:bodyPr wrap="none" rtlCol="0">
+            <a:spAutoFit/>
+          </a:bodyPr>
+          <a:lstStyle/>
+          <a:p>
+            <a:r>
+              <a:rPr lang="en-US" dirty="0">
+                <a:solidFill>
+                  <a:schemeClr val="bg1"/>
+                </a:solidFill>
+              </a:rPr>
+              <a:t>Combined dataframe</a:t>
+            </a:r>
+            <a:endParaRPr lang="en-CA" dirty="0">
+              <a:solidFill>
+                <a:schemeClr val="bg1"/>
+              </a:solidFill>
+            </a:endParaRPr>
+          </a:p>
+        </p:txBody>
+      </p:sp>
+    </p:spTree>
+    <p:extLst>
+      <p:ext uri="{BB962C8B-B14F-4D97-AF65-F5344CB8AC3E}">
+        <p14:creationId xmlns:p14="http://schemas.microsoft.com/office/powerpoint/2010/main" val="3145454337"/>
       </p:ext>
     </p:extLst>
   </p:cSld>

</xml_diff>